<commit_message>
synchronous motor submission files
</commit_message>
<xml_diff>
--- a/Monthly-Presentation/2023.01.09.pptx
+++ b/Monthly-Presentation/2023.01.09.pptx
@@ -335,7 +335,7 @@
               <a:pPr>
                 <a:defRPr/>
               </a:pPr>
-              <a:t>1/10/2023</a:t>
+              <a:t>2/17/2023</a:t>
             </a:fld>
             <a:endParaRPr lang="en-US" dirty="0"/>
           </a:p>
@@ -549,7 +549,7 @@
               <a:pPr>
                 <a:defRPr/>
               </a:pPr>
-              <a:t>1/10/2023</a:t>
+              <a:t>2/16/2023</a:t>
             </a:fld>
             <a:endParaRPr lang="en-US" dirty="0"/>
           </a:p>
@@ -3307,14 +3307,14 @@
           </a:ln>
           <a:extLst>
             <a:ext uri="{909E8E84-426E-40dd-AFC4-6F175D3DCCD1}">
-              <a14:hiddenFill xmlns:a14="http://schemas.microsoft.com/office/drawing/2010/main" xmlns="">
+              <a14:hiddenFill xmlns="" xmlns:a14="http://schemas.microsoft.com/office/drawing/2010/main">
                 <a:solidFill>
                   <a:srgbClr val="FFFFFF"/>
                 </a:solidFill>
               </a14:hiddenFill>
             </a:ext>
             <a:ext uri="{91240B29-F687-4f45-9708-019B960494DF}">
-              <a14:hiddenLine xmlns:a14="http://schemas.microsoft.com/office/drawing/2010/main" xmlns="" w="9525">
+              <a14:hiddenLine xmlns="" xmlns:a14="http://schemas.microsoft.com/office/drawing/2010/main" w="9525">
                 <a:solidFill>
                   <a:srgbClr val="000000"/>
                 </a:solidFill>
@@ -3395,14 +3395,14 @@
           </a:ln>
           <a:extLst>
             <a:ext uri="{909E8E84-426E-40dd-AFC4-6F175D3DCCD1}">
-              <a14:hiddenFill xmlns:a14="http://schemas.microsoft.com/office/drawing/2010/main" xmlns="">
+              <a14:hiddenFill xmlns="" xmlns:a14="http://schemas.microsoft.com/office/drawing/2010/main">
                 <a:solidFill>
                   <a:srgbClr val="FFFFFF"/>
                 </a:solidFill>
               </a14:hiddenFill>
             </a:ext>
             <a:ext uri="{91240B29-F687-4f45-9708-019B960494DF}">
-              <a14:hiddenLine xmlns:a14="http://schemas.microsoft.com/office/drawing/2010/main" xmlns="" w="9525">
+              <a14:hiddenLine xmlns="" xmlns:a14="http://schemas.microsoft.com/office/drawing/2010/main" w="9525">
                 <a:solidFill>
                   <a:srgbClr val="000000"/>
                 </a:solidFill>
@@ -5645,14 +5645,14 @@
           </a:ln>
           <a:extLst>
             <a:ext uri="{909E8E84-426E-40dd-AFC4-6F175D3DCCD1}">
-              <a14:hiddenFill xmlns:a14="http://schemas.microsoft.com/office/drawing/2010/main" xmlns="">
+              <a14:hiddenFill xmlns="" xmlns:a14="http://schemas.microsoft.com/office/drawing/2010/main">
                 <a:solidFill>
                   <a:srgbClr val="FFFFFF"/>
                 </a:solidFill>
               </a14:hiddenFill>
             </a:ext>
             <a:ext uri="{91240B29-F687-4f45-9708-019B960494DF}">
-              <a14:hiddenLine xmlns:a14="http://schemas.microsoft.com/office/drawing/2010/main" xmlns="" w="9525">
+              <a14:hiddenLine xmlns="" xmlns:a14="http://schemas.microsoft.com/office/drawing/2010/main" w="9525">
                 <a:solidFill>
                   <a:srgbClr val="000000"/>
                 </a:solidFill>
@@ -7361,14 +7361,14 @@
           </a:ln>
           <a:extLst>
             <a:ext uri="{909E8E84-426E-40dd-AFC4-6F175D3DCCD1}">
-              <a14:hiddenFill xmlns:a14="http://schemas.microsoft.com/office/drawing/2010/main" xmlns="">
+              <a14:hiddenFill xmlns="" xmlns:a14="http://schemas.microsoft.com/office/drawing/2010/main">
                 <a:solidFill>
                   <a:srgbClr val="FFFFFF"/>
                 </a:solidFill>
               </a14:hiddenFill>
             </a:ext>
             <a:ext uri="{91240B29-F687-4f45-9708-019B960494DF}">
-              <a14:hiddenLine xmlns:a14="http://schemas.microsoft.com/office/drawing/2010/main" xmlns="" w="9525">
+              <a14:hiddenLine xmlns="" xmlns:a14="http://schemas.microsoft.com/office/drawing/2010/main" w="9525">
                 <a:solidFill>
                   <a:srgbClr val="000000"/>
                 </a:solidFill>
@@ -8237,14 +8237,14 @@
           </a:ln>
           <a:extLst>
             <a:ext uri="{909E8E84-426E-40dd-AFC4-6F175D3DCCD1}">
-              <a14:hiddenFill xmlns:a14="http://schemas.microsoft.com/office/drawing/2010/main" xmlns="">
+              <a14:hiddenFill xmlns="" xmlns:a14="http://schemas.microsoft.com/office/drawing/2010/main">
                 <a:solidFill>
                   <a:srgbClr val="FFFFFF"/>
                 </a:solidFill>
               </a14:hiddenFill>
             </a:ext>
             <a:ext uri="{91240B29-F687-4f45-9708-019B960494DF}">
-              <a14:hiddenLine xmlns:a14="http://schemas.microsoft.com/office/drawing/2010/main" xmlns="" w="9525">
+              <a14:hiddenLine xmlns="" xmlns:a14="http://schemas.microsoft.com/office/drawing/2010/main" w="9525">
                 <a:solidFill>
                   <a:srgbClr val="000000"/>
                 </a:solidFill>
@@ -19669,15 +19669,7 @@
           <a:p>
             <a:r>
               <a:rPr lang="en-US" dirty="0"/>
-              <a:t>3-Preparing Balancing  journal draft ( we can </a:t>
-            </a:r>
-            <a:r>
-              <a:rPr lang="en-US" dirty="0" err="1"/>
-              <a:t>focusTPEL</a:t>
-            </a:r>
-            <a:r>
-              <a:rPr lang="en-US" dirty="0"/>
-              <a:t> special section about high power and </a:t>
+              <a:t>3-Preparing Balancing  journal draft ( we can focus TPEL special section about high power and </a:t>
             </a:r>
             <a:r>
               <a:rPr lang="en-US" dirty="0" err="1"/>

</xml_diff>